<commit_message>
Added question page to presentation with link to repo
</commit_message>
<xml_diff>
--- a/LiveTilePresentation.pptx
+++ b/LiveTilePresentation.pptx
@@ -6,13 +6,14 @@
     <p:sldMasterId id="2147483648" r:id="rId6"/>
   </p:sldMasterIdLst>
   <p:notesMasterIdLst>
-    <p:notesMasterId r:id="rId11"/>
+    <p:notesMasterId r:id="rId12"/>
   </p:notesMasterIdLst>
   <p:sldIdLst>
     <p:sldId id="260" r:id="rId7"/>
     <p:sldId id="264" r:id="rId8"/>
     <p:sldId id="270" r:id="rId9"/>
     <p:sldId id="268" r:id="rId10"/>
+    <p:sldId id="271" r:id="rId11"/>
   </p:sldIdLst>
   <p:sldSz cx="9144000" cy="5143500" type="screen16x9"/>
   <p:notesSz cx="7010400" cy="9296400"/>
@@ -2687,6 +2688,128 @@
       </p:par>
     </p:tnLst>
   </p:timing>
+</p:sld>
+</file>
+
+<file path=ppt/slides/slide5.xml><?xml version="1.0" encoding="utf-8"?>
+<p:sld xmlns:a="http://schemas.openxmlformats.org/drawingml/2006/main" xmlns:r="http://schemas.openxmlformats.org/officeDocument/2006/relationships" xmlns:p="http://schemas.openxmlformats.org/presentationml/2006/main">
+  <p:cSld>
+    <p:spTree>
+      <p:nvGrpSpPr>
+        <p:cNvPr id="1" name=""/>
+        <p:cNvGrpSpPr/>
+        <p:nvPr/>
+      </p:nvGrpSpPr>
+      <p:grpSpPr>
+        <a:xfrm>
+          <a:off x="0" y="0"/>
+          <a:ext cx="0" cy="0"/>
+          <a:chOff x="0" y="0"/>
+          <a:chExt cx="0" cy="0"/>
+        </a:xfrm>
+      </p:grpSpPr>
+      <p:sp>
+        <p:nvSpPr>
+          <p:cNvPr id="2" name="Title 1"/>
+          <p:cNvSpPr>
+            <a:spLocks noGrp="1"/>
+          </p:cNvSpPr>
+          <p:nvPr>
+            <p:ph type="title"/>
+          </p:nvPr>
+        </p:nvSpPr>
+        <p:spPr/>
+        <p:txBody>
+          <a:bodyPr/>
+          <a:lstStyle/>
+          <a:p>
+            <a:r>
+              <a:rPr lang="en-US" dirty="0" smtClean="0"/>
+              <a:t>Any questions?</a:t>
+            </a:r>
+            <a:endParaRPr lang="en-US" dirty="0"/>
+          </a:p>
+        </p:txBody>
+      </p:sp>
+      <p:sp>
+        <p:nvSpPr>
+          <p:cNvPr id="3" name="Content Placeholder 2"/>
+          <p:cNvSpPr>
+            <a:spLocks noGrp="1"/>
+          </p:cNvSpPr>
+          <p:nvPr>
+            <p:ph sz="half" idx="1"/>
+          </p:nvPr>
+        </p:nvSpPr>
+        <p:spPr>
+          <a:xfrm>
+            <a:off x="457200" y="1200150"/>
+            <a:ext cx="8229600" cy="3394075"/>
+          </a:xfrm>
+        </p:spPr>
+        <p:txBody>
+          <a:bodyPr/>
+          <a:lstStyle/>
+          <a:p>
+            <a:pPr marL="0" indent="0" algn="ctr">
+              <a:buNone/>
+            </a:pPr>
+            <a:r>
+              <a:rPr lang="en-US" dirty="0">
+                <a:hlinkClick r:id="rId2"/>
+              </a:rPr>
+              <a:t>https</a:t>
+            </a:r>
+            <a:r>
+              <a:rPr lang="en-US">
+                <a:hlinkClick r:id="rId2"/>
+              </a:rPr>
+              <a:t>://</a:t>
+            </a:r>
+            <a:r>
+              <a:rPr lang="en-US" smtClean="0">
+                <a:hlinkClick r:id="rId2"/>
+              </a:rPr>
+              <a:t>github.com/caschw/LiveTileDemos</a:t>
+            </a:r>
+            <a:endParaRPr lang="en-US" dirty="0" smtClean="0"/>
+          </a:p>
+        </p:txBody>
+      </p:sp>
+      <p:pic>
+        <p:nvPicPr>
+          <p:cNvPr id="7" name="Picture 6"/>
+          <p:cNvPicPr>
+            <a:picLocks noChangeAspect="1"/>
+          </p:cNvPicPr>
+          <p:nvPr/>
+        </p:nvPicPr>
+        <p:blipFill>
+          <a:blip r:embed="rId3"/>
+          <a:stretch>
+            <a:fillRect/>
+          </a:stretch>
+        </p:blipFill>
+        <p:spPr>
+          <a:xfrm>
+            <a:off x="2857451" y="1714402"/>
+            <a:ext cx="3429098" cy="3429098"/>
+          </a:xfrm>
+          <a:prstGeom prst="rect">
+            <a:avLst/>
+          </a:prstGeom>
+        </p:spPr>
+      </p:pic>
+    </p:spTree>
+    <p:extLst>
+      <p:ext uri="{BB962C8B-B14F-4D97-AF65-F5344CB8AC3E}">
+        <p14:creationId xmlns:p14="http://schemas.microsoft.com/office/powerpoint/2010/main" val="409162477"/>
+      </p:ext>
+    </p:extLst>
+  </p:cSld>
+  <p:clrMapOvr>
+    <a:masterClrMapping/>
+  </p:clrMapOvr>
 </p:sld>
 </file>
 

</xml_diff>